<commit_message>
Commit addition of the ppt
</commit_message>
<xml_diff>
--- a/Wilbroad Garden Tool.pptx
+++ b/Wilbroad Garden Tool.pptx
@@ -23,6 +23,7 @@
     <p:sldId id="268" r:id="rId18"/>
     <p:sldId id="269" r:id="rId19"/>
     <p:sldId id="270" r:id="rId20"/>
+    <p:sldId id="271" r:id="rId21"/>
   </p:sldIdLst>
   <p:sldSz cy="6858000" cx="9144000"/>
   <p:notesSz cx="6858000" cy="9144000"/>
@@ -271,7 +272,7 @@
       </p15:sldGuideLst>
     </p:ext>
     <p:ext uri="GoogleSlidesCustomDataVersion2">
-      <go:slidesCustomData xmlns:go="http://customooxmlschemas.google.com/" r:id="rId21" roundtripDataSignature="AMtx7miU13Doady5YrBSfwgdtVoSNaZfXQ=="/>
+      <go:slidesCustomData xmlns:go="http://customooxmlschemas.google.com/" r:id="rId22" roundtripDataSignature="AMtx7mgAeIRYLRBW+edu4hpLrNC4iEYjGA=="/>
     </p:ext>
   </p:extLst>
 </p:presentation>
@@ -2651,6 +2652,150 @@
               <a:lnSpc>
                 <a:spcPct val="100000"/>
               </a:lnSpc>
+              <a:spcBef>
+                <a:spcPts val="0"/>
+              </a:spcBef>
+              <a:spcAft>
+                <a:spcPts val="0"/>
+              </a:spcAft>
+              <a:buClr>
+                <a:srgbClr val="000000"/>
+              </a:buClr>
+              <a:buSzPts val="1200"/>
+              <a:buFont typeface="Arial"/>
+              <a:buNone/>
+            </a:pPr>
+            <a:fld id="{00000000-1234-1234-1234-123412341234}" type="slidenum">
+              <a:rPr lang="en-US"/>
+              <a:t>‹#›</a:t>
+            </a:fld>
+            <a:endParaRPr/>
+          </a:p>
+        </p:txBody>
+      </p:sp>
+    </p:spTree>
+  </p:cSld>
+  <p:clrMapOvr>
+    <a:masterClrMapping/>
+  </p:clrMapOvr>
+</p:notes>
+</file>
+
+<file path=ppt/notesSlides/notesSlide16.xml><?xml version="1.0" encoding="utf-8"?>
+<p:notes xmlns:a="http://schemas.openxmlformats.org/drawingml/2006/main" xmlns:r="http://schemas.openxmlformats.org/officeDocument/2006/relationships" xmlns:mc="http://schemas.openxmlformats.org/markup-compatibility/2006" xmlns:mv="urn:schemas-microsoft-com:mac:vml" xmlns:p="http://schemas.openxmlformats.org/presentationml/2006/main" xmlns:c="http://schemas.openxmlformats.org/drawingml/2006/chart" xmlns:dgm="http://schemas.openxmlformats.org/drawingml/2006/diagram" xmlns:o="urn:schemas-microsoft-com:office:office" xmlns:v="urn:schemas-microsoft-com:vml" xmlns:pvml="urn:schemas-microsoft-com:office:powerpoint" xmlns:com="http://schemas.openxmlformats.org/drawingml/2006/compatibility" xmlns:p14="http://schemas.microsoft.com/office/powerpoint/2010/main" xmlns:p15="http://schemas.microsoft.com/office/powerpoint/2012/main" xmlns:ahyp="http://schemas.microsoft.com/office/drawing/2018/hyperlinkcolor" showMasterPhAnim="0" showMasterSp="0">
+  <p:cSld>
+    <p:spTree>
+      <p:nvGrpSpPr>
+        <p:cNvPr id="197" name="Shape 197"/>
+        <p:cNvGrpSpPr/>
+        <p:nvPr/>
+      </p:nvGrpSpPr>
+      <p:grpSpPr>
+        <a:xfrm>
+          <a:off x="0" y="0"/>
+          <a:ext cx="0" cy="0"/>
+          <a:chOff x="0" y="0"/>
+          <a:chExt cx="0" cy="0"/>
+        </a:xfrm>
+      </p:grpSpPr>
+      <p:sp>
+        <p:nvSpPr>
+          <p:cNvPr id="198" name="Google Shape;198;g25712d29710_0_0:notes"/>
+          <p:cNvSpPr/>
+          <p:nvPr>
+            <p:ph idx="2" type="sldImg"/>
+          </p:nvPr>
+        </p:nvSpPr>
+        <p:spPr>
+          <a:xfrm>
+            <a:off x="1371600" y="1143000"/>
+            <a:ext cx="4114800" cy="3086100"/>
+          </a:xfrm>
+          <a:custGeom>
+            <a:rect b="b" l="l" r="r" t="t"/>
+            <a:pathLst>
+              <a:path extrusionOk="0" h="120000" w="120000">
+                <a:moveTo>
+                  <a:pt x="0" y="0"/>
+                </a:moveTo>
+                <a:lnTo>
+                  <a:pt x="120000" y="0"/>
+                </a:lnTo>
+                <a:lnTo>
+                  <a:pt x="120000" y="120000"/>
+                </a:lnTo>
+                <a:lnTo>
+                  <a:pt x="0" y="120000"/>
+                </a:lnTo>
+                <a:close/>
+              </a:path>
+            </a:pathLst>
+          </a:custGeom>
+        </p:spPr>
+      </p:sp>
+      <p:sp>
+        <p:nvSpPr>
+          <p:cNvPr id="199" name="Google Shape;199;g25712d29710_0_0:notes"/>
+          <p:cNvSpPr txBox="1"/>
+          <p:nvPr>
+            <p:ph idx="1" type="body"/>
+          </p:nvPr>
+        </p:nvSpPr>
+        <p:spPr>
+          <a:xfrm>
+            <a:off x="685800" y="4400550"/>
+            <a:ext cx="5486400" cy="3600600"/>
+          </a:xfrm>
+          <a:prstGeom prst="rect">
+            <a:avLst/>
+          </a:prstGeom>
+        </p:spPr>
+        <p:txBody>
+          <a:bodyPr anchorCtr="0" anchor="t" bIns="45700" lIns="91425" spcFirstLastPara="1" rIns="91425" wrap="square" tIns="45700">
+            <a:noAutofit/>
+          </a:bodyPr>
+          <a:lstStyle/>
+          <a:p>
+            <a:pPr indent="0" lvl="0" marL="0" rtl="0" algn="l">
+              <a:spcBef>
+                <a:spcPts val="0"/>
+              </a:spcBef>
+              <a:spcAft>
+                <a:spcPts val="0"/>
+              </a:spcAft>
+              <a:buNone/>
+            </a:pPr>
+            <a:r>
+              <a:t/>
+            </a:r>
+            <a:endParaRPr/>
+          </a:p>
+        </p:txBody>
+      </p:sp>
+      <p:sp>
+        <p:nvSpPr>
+          <p:cNvPr id="200" name="Google Shape;200;g25712d29710_0_0:notes"/>
+          <p:cNvSpPr txBox="1"/>
+          <p:nvPr>
+            <p:ph idx="12" type="sldNum"/>
+          </p:nvPr>
+        </p:nvSpPr>
+        <p:spPr>
+          <a:xfrm>
+            <a:off x="3884613" y="8685213"/>
+            <a:ext cx="2971800" cy="458700"/>
+          </a:xfrm>
+          <a:prstGeom prst="rect">
+            <a:avLst/>
+          </a:prstGeom>
+        </p:spPr>
+        <p:txBody>
+          <a:bodyPr anchorCtr="0" anchor="b" bIns="45700" lIns="91425" spcFirstLastPara="1" rIns="91425" wrap="square" tIns="45700">
+            <a:noAutofit/>
+          </a:bodyPr>
+          <a:lstStyle/>
+          <a:p>
+            <a:pPr indent="0" lvl="0" marL="0" rtl="0" algn="r">
               <a:spcBef>
                 <a:spcPts val="0"/>
               </a:spcBef>
@@ -18169,6 +18314,151 @@
 </p:sld>
 </file>
 
+<file path=ppt/slides/slide16.xml><?xml version="1.0" encoding="utf-8"?>
+<p:sld xmlns:a="http://schemas.openxmlformats.org/drawingml/2006/main" xmlns:r="http://schemas.openxmlformats.org/officeDocument/2006/relationships" xmlns:mc="http://schemas.openxmlformats.org/markup-compatibility/2006" xmlns:mv="urn:schemas-microsoft-com:mac:vml" xmlns:p="http://schemas.openxmlformats.org/presentationml/2006/main" xmlns:c="http://schemas.openxmlformats.org/drawingml/2006/chart" xmlns:dgm="http://schemas.openxmlformats.org/drawingml/2006/diagram" xmlns:o="urn:schemas-microsoft-com:office:office" xmlns:v="urn:schemas-microsoft-com:vml" xmlns:pvml="urn:schemas-microsoft-com:office:powerpoint" xmlns:com="http://schemas.openxmlformats.org/drawingml/2006/compatibility" xmlns:p14="http://schemas.microsoft.com/office/powerpoint/2010/main" xmlns:p15="http://schemas.microsoft.com/office/powerpoint/2012/main" xmlns:ahyp="http://schemas.microsoft.com/office/drawing/2018/hyperlinkcolor">
+  <p:cSld>
+    <p:spTree>
+      <p:nvGrpSpPr>
+        <p:cNvPr id="201" name="Shape 201"/>
+        <p:cNvGrpSpPr/>
+        <p:nvPr/>
+      </p:nvGrpSpPr>
+      <p:grpSpPr>
+        <a:xfrm>
+          <a:off x="0" y="0"/>
+          <a:ext cx="0" cy="0"/>
+          <a:chOff x="0" y="0"/>
+          <a:chExt cx="0" cy="0"/>
+        </a:xfrm>
+      </p:grpSpPr>
+      <p:sp>
+        <p:nvSpPr>
+          <p:cNvPr id="202" name="Google Shape;202;g25712d29710_0_0"/>
+          <p:cNvSpPr txBox="1"/>
+          <p:nvPr>
+            <p:ph type="title"/>
+          </p:nvPr>
+        </p:nvSpPr>
+        <p:spPr>
+          <a:xfrm>
+            <a:off x="457200" y="381000"/>
+            <a:ext cx="8077200" cy="369900"/>
+          </a:xfrm>
+          <a:prstGeom prst="rect">
+            <a:avLst/>
+          </a:prstGeom>
+        </p:spPr>
+        <p:txBody>
+          <a:bodyPr anchorCtr="0" anchor="ctr" bIns="45700" lIns="91425" spcFirstLastPara="1" rIns="91425" wrap="square" tIns="45700">
+            <a:normAutofit fontScale="90000"/>
+          </a:bodyPr>
+          <a:lstStyle/>
+          <a:p>
+            <a:pPr indent="0" lvl="0" marL="0" rtl="0" algn="ctr">
+              <a:spcBef>
+                <a:spcPts val="0"/>
+              </a:spcBef>
+              <a:spcAft>
+                <a:spcPts val="0"/>
+              </a:spcAft>
+              <a:buNone/>
+            </a:pPr>
+            <a:r>
+              <a:rPr lang="en-US"/>
+              <a:t>Github &amp; Youtube Link</a:t>
+            </a:r>
+            <a:endParaRPr/>
+          </a:p>
+        </p:txBody>
+      </p:sp>
+      <p:sp>
+        <p:nvSpPr>
+          <p:cNvPr id="203" name="Google Shape;203;g25712d29710_0_0"/>
+          <p:cNvSpPr txBox="1"/>
+          <p:nvPr>
+            <p:ph idx="1" type="body"/>
+          </p:nvPr>
+        </p:nvSpPr>
+        <p:spPr>
+          <a:xfrm>
+            <a:off x="457200" y="975788"/>
+            <a:ext cx="8229600" cy="5127300"/>
+          </a:xfrm>
+          <a:prstGeom prst="rect">
+            <a:avLst/>
+          </a:prstGeom>
+        </p:spPr>
+        <p:txBody>
+          <a:bodyPr anchorCtr="0" anchor="t" bIns="45700" lIns="91425" spcFirstLastPara="1" rIns="91425" wrap="square" tIns="45700">
+            <a:normAutofit/>
+          </a:bodyPr>
+          <a:lstStyle/>
+          <a:p>
+            <a:pPr indent="0" lvl="0" marL="0" rtl="0" algn="l">
+              <a:spcBef>
+                <a:spcPts val="480"/>
+              </a:spcBef>
+              <a:spcAft>
+                <a:spcPts val="0"/>
+              </a:spcAft>
+              <a:buNone/>
+            </a:pPr>
+            <a:r>
+              <a:rPr lang="en-US"/>
+              <a:t>Github: </a:t>
+            </a:r>
+            <a:r>
+              <a:rPr lang="en-US" u="sng">
+                <a:solidFill>
+                  <a:schemeClr val="hlink"/>
+                </a:solidFill>
+                <a:hlinkClick r:id="rId3"/>
+              </a:rPr>
+              <a:t>https://github.com/owwilly/oworwilbroad2200701450cvgardentool</a:t>
+            </a:r>
+            <a:endParaRPr/>
+          </a:p>
+          <a:p>
+            <a:pPr indent="0" lvl="0" marL="0" rtl="0" algn="l">
+              <a:spcBef>
+                <a:spcPts val="480"/>
+              </a:spcBef>
+              <a:spcAft>
+                <a:spcPts val="0"/>
+              </a:spcAft>
+              <a:buNone/>
+            </a:pPr>
+            <a:r>
+              <a:t/>
+            </a:r>
+            <a:endParaRPr/>
+          </a:p>
+          <a:p>
+            <a:pPr indent="0" lvl="0" marL="0" rtl="0" algn="l">
+              <a:spcBef>
+                <a:spcPts val="480"/>
+              </a:spcBef>
+              <a:spcAft>
+                <a:spcPts val="0"/>
+              </a:spcAft>
+              <a:buNone/>
+            </a:pPr>
+            <a:r>
+              <a:rPr lang="en-US"/>
+              <a:t>Youtube: https://youtu.be/NJN8nXOcJys</a:t>
+            </a:r>
+            <a:endParaRPr/>
+          </a:p>
+        </p:txBody>
+      </p:sp>
+    </p:spTree>
+  </p:cSld>
+  <p:clrMapOvr>
+    <a:masterClrMapping/>
+  </p:clrMapOvr>
+</p:sld>
+</file>
+
 <file path=ppt/slides/slide2.xml><?xml version="1.0" encoding="utf-8"?>
 <p:sld xmlns:a="http://schemas.openxmlformats.org/drawingml/2006/main" xmlns:r="http://schemas.openxmlformats.org/officeDocument/2006/relationships" xmlns:mc="http://schemas.openxmlformats.org/markup-compatibility/2006" xmlns:mv="urn:schemas-microsoft-com:mac:vml" xmlns:p="http://schemas.openxmlformats.org/presentationml/2006/main" xmlns:c="http://schemas.openxmlformats.org/drawingml/2006/chart" xmlns:dgm="http://schemas.openxmlformats.org/drawingml/2006/diagram" xmlns:o="urn:schemas-microsoft-com:office:office" xmlns:v="urn:schemas-microsoft-com:vml" xmlns:pvml="urn:schemas-microsoft-com:office:powerpoint" xmlns:com="http://schemas.openxmlformats.org/drawingml/2006/compatibility" xmlns:p14="http://schemas.microsoft.com/office/powerpoint/2010/main" xmlns:p15="http://schemas.microsoft.com/office/powerpoint/2012/main" xmlns:ahyp="http://schemas.microsoft.com/office/drawing/2018/hyperlinkcolor">
   <p:cSld>
@@ -18261,11 +18551,11 @@
         </p:spPr>
         <p:txBody>
           <a:bodyPr anchorCtr="0" anchor="t" bIns="45700" lIns="91425" spcFirstLastPara="1" rIns="91425" wrap="square" tIns="45700">
-            <a:normAutofit fontScale="92500" lnSpcReduction="20000"/>
+            <a:normAutofit fontScale="77500" lnSpcReduction="20000"/>
           </a:bodyPr>
           <a:lstStyle/>
           <a:p>
-            <a:pPr indent="-398969" lvl="0" marL="457200" rtl="0" algn="l">
+            <a:pPr indent="-371347" lvl="0" marL="457200" rtl="0" algn="l">
               <a:lnSpc>
                 <a:spcPct val="100000"/>
               </a:lnSpc>
@@ -18285,7 +18575,7 @@
             <a:endParaRPr/>
           </a:p>
           <a:p>
-            <a:pPr indent="-398969" lvl="0" marL="457200" rtl="0" algn="l">
+            <a:pPr indent="-371347" lvl="0" marL="457200" rtl="0" algn="l">
               <a:lnSpc>
                 <a:spcPct val="100000"/>
               </a:lnSpc>
@@ -18305,7 +18595,7 @@
             <a:endParaRPr/>
           </a:p>
           <a:p>
-            <a:pPr indent="-398969" lvl="0" marL="457200" rtl="0" algn="l">
+            <a:pPr indent="-371347" lvl="0" marL="457200" rtl="0" algn="l">
               <a:lnSpc>
                 <a:spcPct val="100000"/>
               </a:lnSpc>
@@ -18325,7 +18615,7 @@
             <a:endParaRPr/>
           </a:p>
           <a:p>
-            <a:pPr indent="-398969" lvl="0" marL="457200" rtl="0" algn="l">
+            <a:pPr indent="-371347" lvl="0" marL="457200" rtl="0" algn="l">
               <a:lnSpc>
                 <a:spcPct val="100000"/>
               </a:lnSpc>
@@ -18345,7 +18635,7 @@
             <a:endParaRPr/>
           </a:p>
           <a:p>
-            <a:pPr indent="-398969" lvl="0" marL="457200" rtl="0" algn="l">
+            <a:pPr indent="-371347" lvl="0" marL="457200" rtl="0" algn="l">
               <a:lnSpc>
                 <a:spcPct val="100000"/>
               </a:lnSpc>
@@ -18365,7 +18655,7 @@
             <a:endParaRPr/>
           </a:p>
           <a:p>
-            <a:pPr indent="-398969" lvl="0" marL="457200" rtl="0" algn="l">
+            <a:pPr indent="-371347" lvl="0" marL="457200" rtl="0" algn="l">
               <a:lnSpc>
                 <a:spcPct val="100000"/>
               </a:lnSpc>
@@ -18385,7 +18675,7 @@
             <a:endParaRPr/>
           </a:p>
           <a:p>
-            <a:pPr indent="-398969" lvl="0" marL="457200" rtl="0" algn="l">
+            <a:pPr indent="-371347" lvl="0" marL="457200" rtl="0" algn="l">
               <a:lnSpc>
                 <a:spcPct val="100000"/>
               </a:lnSpc>
@@ -18413,7 +18703,7 @@
             <a:endParaRPr/>
           </a:p>
           <a:p>
-            <a:pPr indent="-398969" lvl="0" marL="457200" rtl="0" algn="l">
+            <a:pPr indent="-371347" lvl="0" marL="457200" rtl="0" algn="l">
               <a:lnSpc>
                 <a:spcPct val="100000"/>
               </a:lnSpc>
@@ -18433,7 +18723,7 @@
             <a:endParaRPr sz="2900"/>
           </a:p>
           <a:p>
-            <a:pPr indent="-398969" lvl="0" marL="457200" rtl="0" algn="l">
+            <a:pPr indent="-371347" lvl="0" marL="457200" rtl="0" algn="l">
               <a:lnSpc>
                 <a:spcPct val="100000"/>
               </a:lnSpc>
@@ -18453,7 +18743,7 @@
             <a:endParaRPr sz="2900"/>
           </a:p>
           <a:p>
-            <a:pPr indent="-398969" lvl="0" marL="457200" rtl="0" algn="l">
+            <a:pPr indent="-371347" lvl="0" marL="457200" rtl="0" algn="l">
               <a:lnSpc>
                 <a:spcPct val="100000"/>
               </a:lnSpc>
@@ -18473,7 +18763,7 @@
             <a:endParaRPr/>
           </a:p>
           <a:p>
-            <a:pPr indent="-398969" lvl="0" marL="457200" rtl="0" algn="l">
+            <a:pPr indent="-371346" lvl="0" marL="457200" rtl="0" algn="l">
               <a:lnSpc>
                 <a:spcPct val="100000"/>
               </a:lnSpc>
@@ -18494,7 +18784,27 @@
               <a:rPr lang="en-US" sz="2900"/>
               <a:t> </a:t>
             </a:r>
-            <a:endParaRPr/>
+            <a:endParaRPr sz="2900"/>
+          </a:p>
+          <a:p>
+            <a:pPr indent="-371347" lvl="0" marL="457200" rtl="0" algn="l">
+              <a:lnSpc>
+                <a:spcPct val="100000"/>
+              </a:lnSpc>
+              <a:spcBef>
+                <a:spcPts val="536"/>
+              </a:spcBef>
+              <a:spcAft>
+                <a:spcPts val="0"/>
+              </a:spcAft>
+              <a:buSzPct val="100000"/>
+              <a:buChar char="❑"/>
+            </a:pPr>
+            <a:r>
+              <a:rPr lang="en-US" sz="2900"/>
+              <a:t>Github and Youtube Links</a:t>
+            </a:r>
+            <a:endParaRPr sz="2900"/>
           </a:p>
           <a:p>
             <a:pPr indent="0" lvl="0" marL="457200" rtl="0" algn="l">

</xml_diff>